<commit_message>
added AUD eval to observation log
</commit_message>
<xml_diff>
--- a/slides/cds431_week8_2.pptx
+++ b/slides/cds431_week8_2.pptx
@@ -122,6 +122,11 @@
       </a:defRPr>
     </a:lvl9pPr>
   </p:defaultTextStyle>
+  <p:extLst>
+    <p:ext uri="{EFAFB233-063F-42B5-8137-9DF3F51BA10A}">
+      <p15:sldGuideLst xmlns:p15="http://schemas.microsoft.com/office/powerpoint/2012/main"/>
+    </p:ext>
+  </p:extLst>
 </p:presentation>
 </file>
 
@@ -5517,7 +5522,7 @@
           <a:p>
             <a:fld id="{97E2ACD8-5AB5-0845-A8B9-3DCE7A7020BE}" type="datetimeFigureOut">
               <a:rPr lang="en-US" smtClean="0"/>
-              <a:t>1/5/22</a:t>
+              <a:t>5/5/22</a:t>
             </a:fld>
             <a:endParaRPr lang="en-US"/>
           </a:p>
@@ -6099,7 +6104,7 @@
           <a:p>
             <a:fld id="{1707EF8C-64A6-E941-B20F-A91EEEA18FCD}" type="datetimeFigureOut">
               <a:rPr lang="en-US" smtClean="0"/>
-              <a:t>1/5/22</a:t>
+              <a:t>5/5/22</a:t>
             </a:fld>
             <a:endParaRPr lang="en-US"/>
           </a:p>
@@ -6297,7 +6302,7 @@
           <a:p>
             <a:fld id="{1707EF8C-64A6-E941-B20F-A91EEEA18FCD}" type="datetimeFigureOut">
               <a:rPr lang="en-US" smtClean="0"/>
-              <a:t>1/5/22</a:t>
+              <a:t>5/5/22</a:t>
             </a:fld>
             <a:endParaRPr lang="en-US"/>
           </a:p>
@@ -6505,7 +6510,7 @@
           <a:p>
             <a:fld id="{1707EF8C-64A6-E941-B20F-A91EEEA18FCD}" type="datetimeFigureOut">
               <a:rPr lang="en-US" smtClean="0"/>
-              <a:t>1/5/22</a:t>
+              <a:t>5/5/22</a:t>
             </a:fld>
             <a:endParaRPr lang="en-US"/>
           </a:p>
@@ -6703,7 +6708,7 @@
           <a:p>
             <a:fld id="{1707EF8C-64A6-E941-B20F-A91EEEA18FCD}" type="datetimeFigureOut">
               <a:rPr lang="en-US" smtClean="0"/>
-              <a:t>1/5/22</a:t>
+              <a:t>5/5/22</a:t>
             </a:fld>
             <a:endParaRPr lang="en-US"/>
           </a:p>
@@ -6978,7 +6983,7 @@
           <a:p>
             <a:fld id="{1707EF8C-64A6-E941-B20F-A91EEEA18FCD}" type="datetimeFigureOut">
               <a:rPr lang="en-US" smtClean="0"/>
-              <a:t>1/5/22</a:t>
+              <a:t>5/5/22</a:t>
             </a:fld>
             <a:endParaRPr lang="en-US"/>
           </a:p>
@@ -7243,7 +7248,7 @@
           <a:p>
             <a:fld id="{1707EF8C-64A6-E941-B20F-A91EEEA18FCD}" type="datetimeFigureOut">
               <a:rPr lang="en-US" smtClean="0"/>
-              <a:t>1/5/22</a:t>
+              <a:t>5/5/22</a:t>
             </a:fld>
             <a:endParaRPr lang="en-US"/>
           </a:p>
@@ -7655,7 +7660,7 @@
           <a:p>
             <a:fld id="{1707EF8C-64A6-E941-B20F-A91EEEA18FCD}" type="datetimeFigureOut">
               <a:rPr lang="en-US" smtClean="0"/>
-              <a:t>1/5/22</a:t>
+              <a:t>5/5/22</a:t>
             </a:fld>
             <a:endParaRPr lang="en-US"/>
           </a:p>
@@ -7796,7 +7801,7 @@
           <a:p>
             <a:fld id="{1707EF8C-64A6-E941-B20F-A91EEEA18FCD}" type="datetimeFigureOut">
               <a:rPr lang="en-US" smtClean="0"/>
-              <a:t>1/5/22</a:t>
+              <a:t>5/5/22</a:t>
             </a:fld>
             <a:endParaRPr lang="en-US"/>
           </a:p>
@@ -7909,7 +7914,7 @@
           <a:p>
             <a:fld id="{1707EF8C-64A6-E941-B20F-A91EEEA18FCD}" type="datetimeFigureOut">
               <a:rPr lang="en-US" smtClean="0"/>
-              <a:t>1/5/22</a:t>
+              <a:t>5/5/22</a:t>
             </a:fld>
             <a:endParaRPr lang="en-US"/>
           </a:p>
@@ -8220,7 +8225,7 @@
           <a:p>
             <a:fld id="{1707EF8C-64A6-E941-B20F-A91EEEA18FCD}" type="datetimeFigureOut">
               <a:rPr lang="en-US" smtClean="0"/>
-              <a:t>1/5/22</a:t>
+              <a:t>5/5/22</a:t>
             </a:fld>
             <a:endParaRPr lang="en-US"/>
           </a:p>
@@ -8508,7 +8513,7 @@
           <a:p>
             <a:fld id="{1707EF8C-64A6-E941-B20F-A91EEEA18FCD}" type="datetimeFigureOut">
               <a:rPr lang="en-US" smtClean="0"/>
-              <a:t>1/5/22</a:t>
+              <a:t>5/5/22</a:t>
             </a:fld>
             <a:endParaRPr lang="en-US"/>
           </a:p>
@@ -8779,7 +8784,7 @@
           <a:p>
             <a:fld id="{1707EF8C-64A6-E941-B20F-A91EEEA18FCD}" type="datetimeFigureOut">
               <a:rPr lang="en-US" smtClean="0"/>
-              <a:t>1/5/22</a:t>
+              <a:t>5/5/22</a:t>
             </a:fld>
             <a:endParaRPr lang="en-US"/>
           </a:p>
@@ -12227,7 +12232,7 @@
             </a:r>
             <a:r>
               <a:rPr lang="en-US" sz="2800" dirty="0"/>
-              <a:t> party payer, agency, 	IEP)</a:t>
+              <a:t> party payer, agency, IEP)</a:t>
             </a:r>
           </a:p>
           <a:p>

</xml_diff>